<commit_message>
Set up figure also changed.
</commit_message>
<xml_diff>
--- a/papers/Case2016/pictures/pdf/SetUp.pptx
+++ b/papers/Case2016/pictures/pdf/SetUp.pptx
@@ -288,7 +288,7 @@
           <a:p>
             <a:fld id="{F694978D-A894-E24D-9868-C9A03761E7E6}" type="datetimeFigureOut">
               <a:rPr lang="en-US" smtClean="0"/>
-              <a:t>3/22/16</a:t>
+              <a:t>3/28/16</a:t>
             </a:fld>
             <a:endParaRPr lang="en-US"/>
           </a:p>
@@ -458,7 +458,7 @@
           <a:p>
             <a:fld id="{F694978D-A894-E24D-9868-C9A03761E7E6}" type="datetimeFigureOut">
               <a:rPr lang="en-US" smtClean="0"/>
-              <a:t>3/22/16</a:t>
+              <a:t>3/28/16</a:t>
             </a:fld>
             <a:endParaRPr lang="en-US"/>
           </a:p>
@@ -638,7 +638,7 @@
           <a:p>
             <a:fld id="{F694978D-A894-E24D-9868-C9A03761E7E6}" type="datetimeFigureOut">
               <a:rPr lang="en-US" smtClean="0"/>
-              <a:t>3/22/16</a:t>
+              <a:t>3/28/16</a:t>
             </a:fld>
             <a:endParaRPr lang="en-US"/>
           </a:p>
@@ -808,7 +808,7 @@
           <a:p>
             <a:fld id="{F694978D-A894-E24D-9868-C9A03761E7E6}" type="datetimeFigureOut">
               <a:rPr lang="en-US" smtClean="0"/>
-              <a:t>3/22/16</a:t>
+              <a:t>3/28/16</a:t>
             </a:fld>
             <a:endParaRPr lang="en-US"/>
           </a:p>
@@ -1054,7 +1054,7 @@
           <a:p>
             <a:fld id="{F694978D-A894-E24D-9868-C9A03761E7E6}" type="datetimeFigureOut">
               <a:rPr lang="en-US" smtClean="0"/>
-              <a:t>3/22/16</a:t>
+              <a:t>3/28/16</a:t>
             </a:fld>
             <a:endParaRPr lang="en-US"/>
           </a:p>
@@ -1342,7 +1342,7 @@
           <a:p>
             <a:fld id="{F694978D-A894-E24D-9868-C9A03761E7E6}" type="datetimeFigureOut">
               <a:rPr lang="en-US" smtClean="0"/>
-              <a:t>3/22/16</a:t>
+              <a:t>3/28/16</a:t>
             </a:fld>
             <a:endParaRPr lang="en-US"/>
           </a:p>
@@ -1764,7 +1764,7 @@
           <a:p>
             <a:fld id="{F694978D-A894-E24D-9868-C9A03761E7E6}" type="datetimeFigureOut">
               <a:rPr lang="en-US" smtClean="0"/>
-              <a:t>3/22/16</a:t>
+              <a:t>3/28/16</a:t>
             </a:fld>
             <a:endParaRPr lang="en-US"/>
           </a:p>
@@ -1882,7 +1882,7 @@
           <a:p>
             <a:fld id="{F694978D-A894-E24D-9868-C9A03761E7E6}" type="datetimeFigureOut">
               <a:rPr lang="en-US" smtClean="0"/>
-              <a:t>3/22/16</a:t>
+              <a:t>3/28/16</a:t>
             </a:fld>
             <a:endParaRPr lang="en-US"/>
           </a:p>
@@ -1977,7 +1977,7 @@
           <a:p>
             <a:fld id="{F694978D-A894-E24D-9868-C9A03761E7E6}" type="datetimeFigureOut">
               <a:rPr lang="en-US" smtClean="0"/>
-              <a:t>3/22/16</a:t>
+              <a:t>3/28/16</a:t>
             </a:fld>
             <a:endParaRPr lang="en-US"/>
           </a:p>
@@ -2254,7 +2254,7 @@
           <a:p>
             <a:fld id="{F694978D-A894-E24D-9868-C9A03761E7E6}" type="datetimeFigureOut">
               <a:rPr lang="en-US" smtClean="0"/>
-              <a:t>3/22/16</a:t>
+              <a:t>3/28/16</a:t>
             </a:fld>
             <a:endParaRPr lang="en-US"/>
           </a:p>
@@ -2507,7 +2507,7 @@
           <a:p>
             <a:fld id="{F694978D-A894-E24D-9868-C9A03761E7E6}" type="datetimeFigureOut">
               <a:rPr lang="en-US" smtClean="0"/>
-              <a:t>3/22/16</a:t>
+              <a:t>3/28/16</a:t>
             </a:fld>
             <a:endParaRPr lang="en-US"/>
           </a:p>
@@ -2720,7 +2720,7 @@
           <a:p>
             <a:fld id="{F694978D-A894-E24D-9868-C9A03761E7E6}" type="datetimeFigureOut">
               <a:rPr lang="en-US" smtClean="0"/>
-              <a:t>3/22/16</a:t>
+              <a:t>3/28/16</a:t>
             </a:fld>
             <a:endParaRPr lang="en-US"/>
           </a:p>
@@ -3112,6 +3112,9 @@
             <a:avLst/>
           </a:prstGeom>
           <a:ln>
+            <a:solidFill>
+              <a:schemeClr val="tx1"/>
+            </a:solidFill>
             <a:tailEnd type="arrow"/>
           </a:ln>
         </p:spPr>
@@ -3219,6 +3222,9 @@
             <a:avLst/>
           </a:prstGeom>
           <a:ln>
+            <a:solidFill>
+              <a:schemeClr val="tx1"/>
+            </a:solidFill>
             <a:tailEnd type="arrow"/>
           </a:ln>
         </p:spPr>
@@ -3252,6 +3258,9 @@
             <a:avLst/>
           </a:prstGeom>
           <a:ln>
+            <a:solidFill>
+              <a:schemeClr val="tx1"/>
+            </a:solidFill>
             <a:tailEnd type="arrow"/>
           </a:ln>
         </p:spPr>
@@ -3285,6 +3294,9 @@
             <a:avLst/>
           </a:prstGeom>
           <a:noFill/>
+          <a:ln>
+            <a:noFill/>
+          </a:ln>
         </p:spPr>
         <p:txBody>
           <a:bodyPr wrap="square" rtlCol="0">
@@ -3323,6 +3335,9 @@
             <a:avLst/>
           </a:prstGeom>
           <a:ln>
+            <a:solidFill>
+              <a:schemeClr val="tx1"/>
+            </a:solidFill>
             <a:tailEnd type="arrow"/>
           </a:ln>
         </p:spPr>
@@ -3802,6 +3817,11 @@
               <a:gd name="adj2" fmla="val 7030606"/>
             </a:avLst>
           </a:prstGeom>
+          <a:ln>
+            <a:solidFill>
+              <a:schemeClr val="tx1"/>
+            </a:solidFill>
+          </a:ln>
         </p:spPr>
         <p:style>
           <a:lnRef idx="2">
@@ -3843,6 +3863,11 @@
               <a:gd name="adj2" fmla="val 1587971"/>
             </a:avLst>
           </a:prstGeom>
+          <a:ln>
+            <a:solidFill>
+              <a:schemeClr val="tx1"/>
+            </a:solidFill>
+          </a:ln>
         </p:spPr>
         <p:style>
           <a:lnRef idx="2">
@@ -3864,6 +3889,150 @@
           <a:p>
             <a:pPr algn="ctr"/>
             <a:endParaRPr lang="en-US"/>
+          </a:p>
+        </p:txBody>
+      </p:sp>
+      <p:cxnSp>
+        <p:nvCxnSpPr>
+          <p:cNvPr id="24" name="Straight Arrow Connector 23"/>
+          <p:cNvCxnSpPr/>
+          <p:nvPr/>
+        </p:nvCxnSpPr>
+        <p:spPr>
+          <a:xfrm flipH="1" flipV="1">
+            <a:off x="4639735" y="4741335"/>
+            <a:ext cx="525626" cy="150178"/>
+          </a:xfrm>
+          <a:prstGeom prst="straightConnector1">
+            <a:avLst/>
+          </a:prstGeom>
+          <a:ln>
+            <a:solidFill>
+              <a:schemeClr val="tx1"/>
+            </a:solidFill>
+            <a:tailEnd type="arrow"/>
+          </a:ln>
+        </p:spPr>
+        <p:style>
+          <a:lnRef idx="2">
+            <a:schemeClr val="accent1"/>
+          </a:lnRef>
+          <a:fillRef idx="0">
+            <a:schemeClr val="accent1"/>
+          </a:fillRef>
+          <a:effectRef idx="1">
+            <a:schemeClr val="accent1"/>
+          </a:effectRef>
+          <a:fontRef idx="minor">
+            <a:schemeClr val="tx1"/>
+          </a:fontRef>
+        </p:style>
+      </p:cxnSp>
+      <p:sp>
+        <p:nvSpPr>
+          <p:cNvPr id="28" name="TextBox 27"/>
+          <p:cNvSpPr txBox="1"/>
+          <p:nvPr/>
+        </p:nvSpPr>
+        <p:spPr>
+          <a:xfrm>
+            <a:off x="5165361" y="4808314"/>
+            <a:ext cx="1037363" cy="369332"/>
+          </a:xfrm>
+          <a:prstGeom prst="rect">
+            <a:avLst/>
+          </a:prstGeom>
+          <a:noFill/>
+        </p:spPr>
+        <p:txBody>
+          <a:bodyPr wrap="square" rtlCol="0">
+            <a:spAutoFit/>
+          </a:bodyPr>
+          <a:lstStyle/>
+          <a:p>
+            <a:r>
+              <a:rPr lang="en-US" dirty="0" smtClean="0">
+                <a:latin typeface="Times"/>
+                <a:cs typeface="Times"/>
+              </a:rPr>
+              <a:t>Pivot</a:t>
+            </a:r>
+            <a:endParaRPr lang="en-US" dirty="0" smtClean="0">
+              <a:latin typeface="Times"/>
+              <a:cs typeface="Times"/>
+            </a:endParaRPr>
+          </a:p>
+        </p:txBody>
+      </p:sp>
+      <p:cxnSp>
+        <p:nvCxnSpPr>
+          <p:cNvPr id="29" name="Straight Arrow Connector 28"/>
+          <p:cNvCxnSpPr/>
+          <p:nvPr/>
+        </p:nvCxnSpPr>
+        <p:spPr>
+          <a:xfrm flipH="1" flipV="1">
+            <a:off x="4148667" y="4393878"/>
+            <a:ext cx="491068" cy="1040321"/>
+          </a:xfrm>
+          <a:prstGeom prst="straightConnector1">
+            <a:avLst/>
+          </a:prstGeom>
+          <a:ln>
+            <a:solidFill>
+              <a:schemeClr val="tx1"/>
+            </a:solidFill>
+            <a:tailEnd type="arrow"/>
+          </a:ln>
+        </p:spPr>
+        <p:style>
+          <a:lnRef idx="2">
+            <a:schemeClr val="accent1"/>
+          </a:lnRef>
+          <a:fillRef idx="0">
+            <a:schemeClr val="accent1"/>
+          </a:fillRef>
+          <a:effectRef idx="1">
+            <a:schemeClr val="accent1"/>
+          </a:effectRef>
+          <a:fontRef idx="minor">
+            <a:schemeClr val="tx1"/>
+          </a:fontRef>
+        </p:style>
+      </p:cxnSp>
+      <p:sp>
+        <p:nvSpPr>
+          <p:cNvPr id="33" name="TextBox 32"/>
+          <p:cNvSpPr txBox="1"/>
+          <p:nvPr/>
+        </p:nvSpPr>
+        <p:spPr>
+          <a:xfrm>
+            <a:off x="4639735" y="5406190"/>
+            <a:ext cx="2811752" cy="369332"/>
+          </a:xfrm>
+          <a:prstGeom prst="rect">
+            <a:avLst/>
+          </a:prstGeom>
+          <a:noFill/>
+        </p:spPr>
+        <p:txBody>
+          <a:bodyPr wrap="square" rtlCol="0">
+            <a:spAutoFit/>
+          </a:bodyPr>
+          <a:lstStyle/>
+          <a:p>
+            <a:r>
+              <a:rPr lang="en-US" dirty="0" smtClean="0">
+                <a:latin typeface="Times"/>
+                <a:cs typeface="Times"/>
+              </a:rPr>
+              <a:t>Large-aspect-ratio rectangle</a:t>
+            </a:r>
+            <a:endParaRPr lang="en-US" dirty="0" smtClean="0">
+              <a:latin typeface="Times"/>
+              <a:cs typeface="Times"/>
+            </a:endParaRPr>
           </a:p>
         </p:txBody>
       </p:sp>

</xml_diff>